<commit_message>
Added future features slide
</commit_message>
<xml_diff>
--- a/NoteShift_Pitch.pptx
+++ b/NoteShift_Pitch.pptx
@@ -12,10 +12,11 @@
     <p:sldId id="261" r:id="rId6"/>
     <p:sldId id="260" r:id="rId7"/>
     <p:sldId id="263" r:id="rId8"/>
-    <p:sldId id="264" r:id="rId9"/>
-    <p:sldId id="266" r:id="rId10"/>
-    <p:sldId id="262" r:id="rId11"/>
-    <p:sldId id="265" r:id="rId12"/>
+    <p:sldId id="267" r:id="rId9"/>
+    <p:sldId id="264" r:id="rId10"/>
+    <p:sldId id="266" r:id="rId11"/>
+    <p:sldId id="262" r:id="rId12"/>
+    <p:sldId id="265" r:id="rId13"/>
   </p:sldIdLst>
   <p:sldSz cx="12192000" cy="6858000"/>
   <p:notesSz cx="6858000" cy="9144000"/>
@@ -5871,6 +5872,338 @@
           <p:cNvPr id="2" name="Title 1">
             <a:extLst>
               <a:ext uri="{FF2B5EF4-FFF2-40B4-BE49-F238E27FC236}">
+                <a16:creationId xmlns:a16="http://schemas.microsoft.com/office/drawing/2014/main" id="{228B5CFF-5631-6140-9894-CBCF5B99B19D}"/>
+              </a:ext>
+            </a:extLst>
+          </p:cNvPr>
+          <p:cNvSpPr>
+            <a:spLocks noGrp="1"/>
+          </p:cNvSpPr>
+          <p:nvPr>
+            <p:ph type="title"/>
+          </p:nvPr>
+        </p:nvSpPr>
+        <p:spPr/>
+        <p:txBody>
+          <a:bodyPr/>
+          <a:lstStyle/>
+          <a:p>
+            <a:r>
+              <a:rPr lang="en-US" dirty="0"/>
+              <a:t>Explanation (cont.)</a:t>
+            </a:r>
+          </a:p>
+        </p:txBody>
+      </p:sp>
+      <p:sp>
+        <p:nvSpPr>
+          <p:cNvPr id="3" name="Content Placeholder 2">
+            <a:extLst>
+              <a:ext uri="{FF2B5EF4-FFF2-40B4-BE49-F238E27FC236}">
+                <a16:creationId xmlns:a16="http://schemas.microsoft.com/office/drawing/2014/main" id="{28D89F92-8028-F34B-BA8E-FAC759A16077}"/>
+              </a:ext>
+            </a:extLst>
+          </p:cNvPr>
+          <p:cNvSpPr>
+            <a:spLocks noGrp="1"/>
+          </p:cNvSpPr>
+          <p:nvPr>
+            <p:ph idx="1"/>
+          </p:nvPr>
+        </p:nvSpPr>
+        <p:spPr/>
+        <p:txBody>
+          <a:bodyPr>
+            <a:normAutofit fontScale="25000" lnSpcReduction="20000"/>
+          </a:bodyPr>
+          <a:lstStyle/>
+          <a:p>
+            <a:pPr marL="0" indent="0">
+              <a:buNone/>
+            </a:pPr>
+            <a:r>
+              <a:rPr lang="en-US" dirty="0"/>
+              <a:t>The front-end gathers details such as the current key and the desired</a:t>
+            </a:r>
+          </a:p>
+          <a:p>
+            <a:pPr marL="0" indent="0">
+              <a:buNone/>
+            </a:pPr>
+            <a:r>
+              <a:rPr lang="en-US" dirty="0"/>
+              <a:t>semitone change/transposed key (</a:t>
+            </a:r>
+            <a:r>
+              <a:rPr lang="en-US" dirty="0" err="1"/>
+              <a:t>necesary</a:t>
+            </a:r>
+            <a:r>
+              <a:rPr lang="en-US" dirty="0"/>
+              <a:t> for correct enharmonic label-</a:t>
+            </a:r>
+          </a:p>
+          <a:p>
+            <a:pPr marL="0" indent="0">
+              <a:buNone/>
+            </a:pPr>
+            <a:r>
+              <a:rPr lang="en-US" dirty="0" err="1"/>
+              <a:t>ing</a:t>
+            </a:r>
+            <a:r>
+              <a:rPr lang="en-US" dirty="0"/>
+              <a:t>), and of course, the image file of the music score. Then the back</a:t>
+            </a:r>
+          </a:p>
+          <a:p>
+            <a:pPr marL="0" indent="0">
+              <a:buNone/>
+            </a:pPr>
+            <a:r>
+              <a:rPr lang="en-US" dirty="0"/>
+              <a:t>-end does several steps:</a:t>
+            </a:r>
+          </a:p>
+          <a:p>
+            <a:pPr marL="0" indent="0">
+              <a:buNone/>
+            </a:pPr>
+            <a:endParaRPr lang="en-US" dirty="0"/>
+          </a:p>
+          <a:p>
+            <a:pPr marL="0" indent="0">
+              <a:buNone/>
+            </a:pPr>
+            <a:r>
+              <a:rPr lang="en-US" dirty="0"/>
+              <a:t>1. Crops (Thresholds) and transforms image into rectangle. (Automated</a:t>
+            </a:r>
+          </a:p>
+          <a:p>
+            <a:pPr marL="0" indent="0">
+              <a:buNone/>
+            </a:pPr>
+            <a:r>
+              <a:rPr lang="en-US" dirty="0"/>
+              <a:t>using Open CV) [1]</a:t>
+            </a:r>
+          </a:p>
+          <a:p>
+            <a:pPr marL="0" indent="0">
+              <a:buNone/>
+            </a:pPr>
+            <a:endParaRPr lang="en-US" dirty="0"/>
+          </a:p>
+          <a:p>
+            <a:pPr marL="0" indent="0">
+              <a:buNone/>
+            </a:pPr>
+            <a:r>
+              <a:rPr lang="en-US" dirty="0"/>
+              <a:t>2. Change image to PDF through API [2]</a:t>
+            </a:r>
+          </a:p>
+          <a:p>
+            <a:pPr marL="0" indent="0">
+              <a:buNone/>
+            </a:pPr>
+            <a:endParaRPr lang="en-US" dirty="0"/>
+          </a:p>
+          <a:p>
+            <a:pPr marL="0" indent="0">
+              <a:buNone/>
+            </a:pPr>
+            <a:r>
+              <a:rPr lang="en-US" dirty="0"/>
+              <a:t>3. PDF through OMV to </a:t>
+            </a:r>
+            <a:r>
+              <a:rPr lang="en-US" dirty="0" err="1"/>
+              <a:t>MusicXML</a:t>
+            </a:r>
+            <a:r>
+              <a:rPr lang="en-US" dirty="0"/>
+              <a:t> [3]</a:t>
+            </a:r>
+          </a:p>
+          <a:p>
+            <a:pPr marL="0" indent="0">
+              <a:buNone/>
+            </a:pPr>
+            <a:endParaRPr lang="en-US" dirty="0"/>
+          </a:p>
+          <a:p>
+            <a:pPr marL="0" indent="0">
+              <a:buNone/>
+            </a:pPr>
+            <a:r>
+              <a:rPr lang="en-US" dirty="0"/>
+              <a:t>4. Transpose </a:t>
+            </a:r>
+            <a:r>
+              <a:rPr lang="en-US" dirty="0" err="1"/>
+              <a:t>MusicXML</a:t>
+            </a:r>
+            <a:r>
+              <a:rPr lang="en-US" dirty="0"/>
+              <a:t> using scripts [4]</a:t>
+            </a:r>
+          </a:p>
+          <a:p>
+            <a:pPr marL="0" indent="0">
+              <a:buNone/>
+            </a:pPr>
+            <a:endParaRPr lang="en-US" dirty="0"/>
+          </a:p>
+          <a:p>
+            <a:pPr marL="0" indent="0">
+              <a:buNone/>
+            </a:pPr>
+            <a:r>
+              <a:rPr lang="en-US" dirty="0"/>
+              <a:t>5. </a:t>
+            </a:r>
+            <a:r>
+              <a:rPr lang="en-US" dirty="0" err="1"/>
+              <a:t>MusicXML</a:t>
+            </a:r>
+            <a:r>
+              <a:rPr lang="en-US" dirty="0"/>
+              <a:t> to other formats [5]</a:t>
+            </a:r>
+          </a:p>
+          <a:p>
+            <a:pPr marL="0" indent="0">
+              <a:buNone/>
+            </a:pPr>
+            <a:endParaRPr lang="en-US" dirty="0"/>
+          </a:p>
+          <a:p>
+            <a:pPr marL="0" indent="0">
+              <a:buNone/>
+            </a:pPr>
+            <a:r>
+              <a:rPr lang="en-US" dirty="0"/>
+              <a:t>Data between the front-end and back-end will be sent using either AJAX</a:t>
+            </a:r>
+          </a:p>
+          <a:p>
+            <a:pPr marL="0" indent="0">
+              <a:buNone/>
+            </a:pPr>
+            <a:r>
+              <a:rPr lang="en-US" dirty="0"/>
+              <a:t>or </a:t>
+            </a:r>
+            <a:r>
+              <a:rPr lang="en-US" dirty="0" err="1"/>
+              <a:t>JQuery</a:t>
+            </a:r>
+            <a:r>
+              <a:rPr lang="en-US" dirty="0"/>
+              <a:t>, and received and processed with either NodeJS or Bash on an</a:t>
+            </a:r>
+          </a:p>
+          <a:p>
+            <a:pPr marL="0" indent="0">
+              <a:buNone/>
+            </a:pPr>
+            <a:r>
+              <a:rPr lang="en-US" dirty="0"/>
+              <a:t>Apache server. Proper CGI, user-friendliness, and responsive UI/UX is</a:t>
+            </a:r>
+          </a:p>
+          <a:p>
+            <a:pPr marL="0" indent="0">
+              <a:buNone/>
+            </a:pPr>
+            <a:r>
+              <a:rPr lang="en-US" dirty="0"/>
+              <a:t>attempted. </a:t>
+            </a:r>
+            <a:r>
+              <a:rPr lang="en-US" dirty="0" err="1"/>
+              <a:t>Strech</a:t>
+            </a:r>
+            <a:r>
+              <a:rPr lang="en-US" dirty="0"/>
+              <a:t> goals including displaying original and transposed</a:t>
+            </a:r>
+          </a:p>
+          <a:p>
+            <a:pPr marL="0" indent="0">
+              <a:buNone/>
+            </a:pPr>
+            <a:r>
+              <a:rPr lang="en-US" dirty="0"/>
+              <a:t>side by side, playing audio file, and transposing different parts of</a:t>
+            </a:r>
+          </a:p>
+          <a:p>
+            <a:pPr marL="0" indent="0">
+              <a:buNone/>
+            </a:pPr>
+            <a:r>
+              <a:rPr lang="en-US" dirty="0"/>
+              <a:t>the score to different keys. For copyright compliance, digital files</a:t>
+            </a:r>
+          </a:p>
+          <a:p>
+            <a:pPr marL="0" indent="0">
+              <a:buNone/>
+            </a:pPr>
+            <a:r>
+              <a:rPr lang="en-US" dirty="0"/>
+              <a:t>will not be able for public download, and all files will be marked at</a:t>
+            </a:r>
+          </a:p>
+          <a:p>
+            <a:pPr marL="0" indent="0">
+              <a:buNone/>
+            </a:pPr>
+            <a:r>
+              <a:rPr lang="en-US" dirty="0"/>
+              <a:t>the end of each session and removed periodically.</a:t>
+            </a:r>
+          </a:p>
+        </p:txBody>
+      </p:sp>
+    </p:spTree>
+    <p:extLst>
+      <p:ext uri="{BB962C8B-B14F-4D97-AF65-F5344CB8AC3E}">
+        <p14:creationId xmlns:p14="http://schemas.microsoft.com/office/powerpoint/2010/main" val="259731231"/>
+      </p:ext>
+    </p:extLst>
+  </p:cSld>
+  <p:clrMapOvr>
+    <a:masterClrMapping/>
+  </p:clrMapOvr>
+</p:sld>
+</file>
+
+<file path=ppt/slides/slide11.xml><?xml version="1.0" encoding="utf-8"?>
+<p:sld xmlns:a="http://schemas.openxmlformats.org/drawingml/2006/main" xmlns:r="http://schemas.openxmlformats.org/officeDocument/2006/relationships" xmlns:p="http://schemas.openxmlformats.org/presentationml/2006/main">
+  <p:cSld>
+    <p:spTree>
+      <p:nvGrpSpPr>
+        <p:cNvPr id="1" name=""/>
+        <p:cNvGrpSpPr/>
+        <p:nvPr/>
+      </p:nvGrpSpPr>
+      <p:grpSpPr>
+        <a:xfrm>
+          <a:off x="0" y="0"/>
+          <a:ext cx="0" cy="0"/>
+          <a:chOff x="0" y="0"/>
+          <a:chExt cx="0" cy="0"/>
+        </a:xfrm>
+      </p:grpSpPr>
+      <p:sp>
+        <p:nvSpPr>
+          <p:cNvPr id="2" name="Title 1">
+            <a:extLst>
+              <a:ext uri="{FF2B5EF4-FFF2-40B4-BE49-F238E27FC236}">
                 <a16:creationId xmlns:a16="http://schemas.microsoft.com/office/drawing/2014/main" id="{BBCDF6A1-8574-6E4B-8E9B-23528BB46943}"/>
               </a:ext>
             </a:extLst>
@@ -5935,7 +6268,7 @@
 </p:sld>
 </file>
 
-<file path=ppt/slides/slide11.xml><?xml version="1.0" encoding="utf-8"?>
+<file path=ppt/slides/slide12.xml><?xml version="1.0" encoding="utf-8"?>
 <p:sld xmlns:a="http://schemas.openxmlformats.org/drawingml/2006/main" xmlns:r="http://schemas.openxmlformats.org/officeDocument/2006/relationships" xmlns:p="http://schemas.openxmlformats.org/presentationml/2006/main">
   <p:cSld>
     <p:spTree>
@@ -6922,7 +7255,7 @@
           <p:cNvPr id="2" name="Title 1">
             <a:extLst>
               <a:ext uri="{FF2B5EF4-FFF2-40B4-BE49-F238E27FC236}">
-                <a16:creationId xmlns:a16="http://schemas.microsoft.com/office/drawing/2014/main" id="{140E517F-CD9D-2B41-861D-D9D5B461552B}"/>
+                <a16:creationId xmlns:a16="http://schemas.microsoft.com/office/drawing/2014/main" id="{0D568EFA-A4DF-1345-8EA8-BADD21EEFF98}"/>
               </a:ext>
             </a:extLst>
           </p:cNvPr>
@@ -6939,9 +7272,10 @@
           <a:lstStyle/>
           <a:p>
             <a:r>
-              <a:rPr lang="en-US" dirty="0"/>
-              <a:t>Explanation</a:t>
-            </a:r>
+              <a:rPr lang="en-US"/>
+              <a:t>Future Goals/FEATURES</a:t>
+            </a:r>
+            <a:endParaRPr lang="en-US" dirty="0"/>
           </a:p>
         </p:txBody>
       </p:sp>
@@ -6950,7 +7284,7 @@
           <p:cNvPr id="3" name="Content Placeholder 2">
             <a:extLst>
               <a:ext uri="{FF2B5EF4-FFF2-40B4-BE49-F238E27FC236}">
-                <a16:creationId xmlns:a16="http://schemas.microsoft.com/office/drawing/2014/main" id="{00E1EF18-0128-AA41-B7DD-F9EDC0CF0DBD}"/>
+                <a16:creationId xmlns:a16="http://schemas.microsoft.com/office/drawing/2014/main" id="{844BC53F-4400-9D44-9AE6-58D9E63B1919}"/>
               </a:ext>
             </a:extLst>
           </p:cNvPr>
@@ -6963,203 +7297,17 @@
         </p:nvSpPr>
         <p:spPr/>
         <p:txBody>
-          <a:bodyPr>
-            <a:normAutofit fontScale="25000" lnSpcReduction="20000"/>
-          </a:bodyPr>
-          <a:lstStyle/>
-          <a:p>
-            <a:pPr marL="0" indent="0">
-              <a:buNone/>
-            </a:pPr>
-            <a:r>
-              <a:rPr lang="en-US" dirty="0"/>
-              <a:t>This involves 3 basic parts:</a:t>
-            </a:r>
-          </a:p>
-          <a:p>
-            <a:pPr marL="0" indent="0">
-              <a:buNone/>
-            </a:pPr>
-            <a:endParaRPr lang="en-US" dirty="0"/>
-          </a:p>
-          <a:p>
-            <a:pPr marL="0" indent="0">
-              <a:buNone/>
-            </a:pPr>
-            <a:r>
-              <a:rPr lang="en-US" dirty="0"/>
-              <a:t>1. Convert Picture to digital music format</a:t>
-            </a:r>
-          </a:p>
-          <a:p>
-            <a:pPr marL="0" indent="0">
-              <a:buNone/>
-            </a:pPr>
-            <a:r>
-              <a:rPr lang="en-US" dirty="0"/>
-              <a:t>2. Transposition</a:t>
-            </a:r>
-          </a:p>
-          <a:p>
-            <a:pPr marL="0" indent="0">
-              <a:buNone/>
-            </a:pPr>
-            <a:r>
-              <a:rPr lang="en-US" dirty="0"/>
-              <a:t>3. Convert digital music format back to picture.</a:t>
-            </a:r>
-          </a:p>
-          <a:p>
-            <a:pPr marL="0" indent="0">
-              <a:buNone/>
-            </a:pPr>
-            <a:endParaRPr lang="en-US" dirty="0"/>
-          </a:p>
-          <a:p>
-            <a:pPr marL="0" indent="0">
-              <a:buNone/>
-            </a:pPr>
-            <a:r>
-              <a:rPr lang="en-US" dirty="0"/>
-              <a:t>Under our research, each of these three components exist individually.</a:t>
-            </a:r>
-          </a:p>
-          <a:p>
-            <a:pPr marL="0" indent="0">
-              <a:buNone/>
-            </a:pPr>
-            <a:r>
-              <a:rPr lang="en-US" dirty="0"/>
-              <a:t>The mega site IMSLP hosts countless historical music scores, and digit-</a:t>
-            </a:r>
-          </a:p>
-          <a:p>
-            <a:pPr marL="0" indent="0">
-              <a:buNone/>
-            </a:pPr>
-            <a:r>
-              <a:rPr lang="en-US" dirty="0"/>
-              <a:t>ally </a:t>
-            </a:r>
-            <a:r>
-              <a:rPr lang="en-US" dirty="0" err="1"/>
-              <a:t>catelogs</a:t>
-            </a:r>
-            <a:r>
-              <a:rPr lang="en-US" dirty="0"/>
-              <a:t> many with OMR (Optical Music Recognition) technology.</a:t>
-            </a:r>
-          </a:p>
-          <a:p>
-            <a:pPr marL="0" indent="0">
-              <a:buNone/>
-            </a:pPr>
-            <a:r>
-              <a:rPr lang="en-US" dirty="0"/>
-              <a:t>Programs like LMMS, Audacity, FL Studio, and many more transpose music</a:t>
-            </a:r>
-          </a:p>
-          <a:p>
-            <a:pPr marL="0" indent="0">
-              <a:buNone/>
-            </a:pPr>
-            <a:r>
-              <a:rPr lang="en-US" dirty="0"/>
-              <a:t>easily. And the program </a:t>
-            </a:r>
-            <a:r>
-              <a:rPr lang="en-US" dirty="0" err="1"/>
-              <a:t>MuseScore</a:t>
-            </a:r>
-            <a:r>
-              <a:rPr lang="en-US" dirty="0"/>
-              <a:t>, a music notation software, has the</a:t>
-            </a:r>
-          </a:p>
-          <a:p>
-            <a:pPr marL="0" indent="0">
-              <a:buNone/>
-            </a:pPr>
-            <a:r>
-              <a:rPr lang="en-US" dirty="0"/>
-              <a:t>ability to change digital music formats to a visual pdf score.</a:t>
-            </a:r>
-          </a:p>
-          <a:p>
-            <a:pPr marL="0" indent="0">
-              <a:buNone/>
-            </a:pPr>
-            <a:endParaRPr lang="en-US" dirty="0"/>
-          </a:p>
-          <a:p>
-            <a:pPr marL="0" indent="0">
-              <a:buNone/>
-            </a:pPr>
-            <a:r>
-              <a:rPr lang="en-US" dirty="0"/>
-              <a:t>However, it appears that these three steps have never been combined into</a:t>
-            </a:r>
-          </a:p>
-          <a:p>
-            <a:pPr marL="0" indent="0">
-              <a:buNone/>
-            </a:pPr>
-            <a:r>
-              <a:rPr lang="en-US" dirty="0"/>
-              <a:t>a simple, quick, useful solution to real-time transcriptions of music.</a:t>
-            </a:r>
-          </a:p>
-          <a:p>
-            <a:pPr marL="0" indent="0">
-              <a:buNone/>
-            </a:pPr>
-            <a:endParaRPr lang="en-US" dirty="0"/>
-          </a:p>
-          <a:p>
-            <a:pPr marL="0" indent="0">
-              <a:buNone/>
-            </a:pPr>
-            <a:r>
-              <a:rPr lang="en-US" dirty="0"/>
-              <a:t>Our project automates these three steps into one powerful web-app, </a:t>
-            </a:r>
-            <a:r>
-              <a:rPr lang="en-US" dirty="0" err="1"/>
-              <a:t>acce</a:t>
-            </a:r>
-            <a:r>
-              <a:rPr lang="en-US" dirty="0"/>
-              <a:t>-</a:t>
-            </a:r>
-          </a:p>
-          <a:p>
-            <a:pPr marL="0" indent="0">
-              <a:buNone/>
-            </a:pPr>
-            <a:r>
-              <a:rPr lang="en-US" dirty="0" err="1"/>
-              <a:t>ssable</a:t>
-            </a:r>
-            <a:r>
-              <a:rPr lang="en-US" dirty="0"/>
-              <a:t> by any electronic device capable of connecting to the internet,</a:t>
-            </a:r>
-          </a:p>
-          <a:p>
-            <a:pPr marL="0" indent="0">
-              <a:buNone/>
-            </a:pPr>
-            <a:r>
-              <a:rPr lang="en-US" dirty="0"/>
-              <a:t>including phones and tablets.</a:t>
-            </a:r>
+          <a:bodyPr/>
+          <a:lstStyle/>
+          <a:p>
+            <a:endParaRPr lang="en-US" dirty="0"/>
           </a:p>
         </p:txBody>
       </p:sp>
     </p:spTree>
     <p:extLst>
       <p:ext uri="{BB962C8B-B14F-4D97-AF65-F5344CB8AC3E}">
-        <p14:creationId xmlns:p14="http://schemas.microsoft.com/office/powerpoint/2010/main" val="4262361891"/>
+        <p14:creationId xmlns:p14="http://schemas.microsoft.com/office/powerpoint/2010/main" val="342523809"/>
       </p:ext>
     </p:extLst>
   </p:cSld>
@@ -7191,7 +7339,7 @@
           <p:cNvPr id="2" name="Title 1">
             <a:extLst>
               <a:ext uri="{FF2B5EF4-FFF2-40B4-BE49-F238E27FC236}">
-                <a16:creationId xmlns:a16="http://schemas.microsoft.com/office/drawing/2014/main" id="{228B5CFF-5631-6140-9894-CBCF5B99B19D}"/>
+                <a16:creationId xmlns:a16="http://schemas.microsoft.com/office/drawing/2014/main" id="{140E517F-CD9D-2B41-861D-D9D5B461552B}"/>
               </a:ext>
             </a:extLst>
           </p:cNvPr>
@@ -7209,7 +7357,7 @@
           <a:p>
             <a:r>
               <a:rPr lang="en-US" dirty="0"/>
-              <a:t>Explanation (cont.)</a:t>
+              <a:t>Explanation</a:t>
             </a:r>
           </a:p>
         </p:txBody>
@@ -7219,7 +7367,7 @@
           <p:cNvPr id="3" name="Content Placeholder 2">
             <a:extLst>
               <a:ext uri="{FF2B5EF4-FFF2-40B4-BE49-F238E27FC236}">
-                <a16:creationId xmlns:a16="http://schemas.microsoft.com/office/drawing/2014/main" id="{28D89F92-8028-F34B-BA8E-FAC759A16077}"/>
+                <a16:creationId xmlns:a16="http://schemas.microsoft.com/office/drawing/2014/main" id="{00E1EF18-0128-AA41-B7DD-F9EDC0CF0DBD}"/>
               </a:ext>
             </a:extLst>
           </p:cNvPr>
@@ -7242,24 +7390,81 @@
             </a:pPr>
             <a:r>
               <a:rPr lang="en-US" dirty="0"/>
-              <a:t>The front-end gathers details such as the current key and the desired</a:t>
+              <a:t>This involves 3 basic parts:</a:t>
             </a:r>
           </a:p>
           <a:p>
             <a:pPr marL="0" indent="0">
               <a:buNone/>
             </a:pPr>
-            <a:r>
-              <a:rPr lang="en-US" dirty="0"/>
-              <a:t>semitone change/transposed key (</a:t>
+            <a:endParaRPr lang="en-US" dirty="0"/>
+          </a:p>
+          <a:p>
+            <a:pPr marL="0" indent="0">
+              <a:buNone/>
+            </a:pPr>
+            <a:r>
+              <a:rPr lang="en-US" dirty="0"/>
+              <a:t>1. Convert Picture to digital music format</a:t>
+            </a:r>
+          </a:p>
+          <a:p>
+            <a:pPr marL="0" indent="0">
+              <a:buNone/>
+            </a:pPr>
+            <a:r>
+              <a:rPr lang="en-US" dirty="0"/>
+              <a:t>2. Transposition</a:t>
+            </a:r>
+          </a:p>
+          <a:p>
+            <a:pPr marL="0" indent="0">
+              <a:buNone/>
+            </a:pPr>
+            <a:r>
+              <a:rPr lang="en-US" dirty="0"/>
+              <a:t>3. Convert digital music format back to picture.</a:t>
+            </a:r>
+          </a:p>
+          <a:p>
+            <a:pPr marL="0" indent="0">
+              <a:buNone/>
+            </a:pPr>
+            <a:endParaRPr lang="en-US" dirty="0"/>
+          </a:p>
+          <a:p>
+            <a:pPr marL="0" indent="0">
+              <a:buNone/>
+            </a:pPr>
+            <a:r>
+              <a:rPr lang="en-US" dirty="0"/>
+              <a:t>Under our research, each of these three components exist individually.</a:t>
+            </a:r>
+          </a:p>
+          <a:p>
+            <a:pPr marL="0" indent="0">
+              <a:buNone/>
+            </a:pPr>
+            <a:r>
+              <a:rPr lang="en-US" dirty="0"/>
+              <a:t>The mega site IMSLP hosts countless historical music scores, and digit-</a:t>
+            </a:r>
+          </a:p>
+          <a:p>
+            <a:pPr marL="0" indent="0">
+              <a:buNone/>
+            </a:pPr>
+            <a:r>
+              <a:rPr lang="en-US" dirty="0"/>
+              <a:t>ally </a:t>
             </a:r>
             <a:r>
               <a:rPr lang="en-US" dirty="0" err="1"/>
-              <a:t>necesary</a:t>
-            </a:r>
-            <a:r>
-              <a:rPr lang="en-US" dirty="0"/>
-              <a:t> for correct enharmonic label-</a:t>
+              <a:t>catelogs</a:t>
+            </a:r>
+            <a:r>
+              <a:rPr lang="en-US" dirty="0"/>
+              <a:t> many with OMR (Optical Music Recognition) technology.</a:t>
             </a:r>
           </a:p>
           <a:p>
@@ -7267,12 +7472,25 @@
               <a:buNone/>
             </a:pPr>
             <a:r>
+              <a:rPr lang="en-US" dirty="0"/>
+              <a:t>Programs like LMMS, Audacity, FL Studio, and many more transpose music</a:t>
+            </a:r>
+          </a:p>
+          <a:p>
+            <a:pPr marL="0" indent="0">
+              <a:buNone/>
+            </a:pPr>
+            <a:r>
+              <a:rPr lang="en-US" dirty="0"/>
+              <a:t>easily. And the program </a:t>
+            </a:r>
+            <a:r>
               <a:rPr lang="en-US" dirty="0" err="1"/>
-              <a:t>ing</a:t>
-            </a:r>
-            <a:r>
-              <a:rPr lang="en-US" dirty="0"/>
-              <a:t>), and of course, the image file of the music score. Then the back</a:t>
+              <a:t>MuseScore</a:t>
+            </a:r>
+            <a:r>
+              <a:rPr lang="en-US" dirty="0"/>
+              <a:t>, a music notation software, has the</a:t>
             </a:r>
           </a:p>
           <a:p>
@@ -7281,7 +7499,7 @@
             </a:pPr>
             <a:r>
               <a:rPr lang="en-US" dirty="0"/>
-              <a:t>-end does several steps:</a:t>
+              <a:t>ability to change digital music formats to a visual pdf score.</a:t>
             </a:r>
           </a:p>
           <a:p>
@@ -7296,7 +7514,7 @@
             </a:pPr>
             <a:r>
               <a:rPr lang="en-US" dirty="0"/>
-              <a:t>1. Crops (Thresholds) and transforms image into rectangle. (Automated</a:t>
+              <a:t>However, it appears that these three steps have never been combined into</a:t>
             </a:r>
           </a:p>
           <a:p>
@@ -7305,7 +7523,7 @@
             </a:pPr>
             <a:r>
               <a:rPr lang="en-US" dirty="0"/>
-              <a:t>using Open CV) [1]</a:t>
+              <a:t>a simple, quick, useful solution to real-time transcriptions of music.</a:t>
             </a:r>
           </a:p>
           <a:p>
@@ -7320,14 +7538,29 @@
             </a:pPr>
             <a:r>
               <a:rPr lang="en-US" dirty="0"/>
-              <a:t>2. Change image to PDF through API [2]</a:t>
+              <a:t>Our project automates these three steps into one powerful web-app, </a:t>
+            </a:r>
+            <a:r>
+              <a:rPr lang="en-US" dirty="0" err="1"/>
+              <a:t>acce</a:t>
+            </a:r>
+            <a:r>
+              <a:rPr lang="en-US" dirty="0"/>
+              <a:t>-</a:t>
             </a:r>
           </a:p>
           <a:p>
             <a:pPr marL="0" indent="0">
               <a:buNone/>
             </a:pPr>
-            <a:endParaRPr lang="en-US" dirty="0"/>
+            <a:r>
+              <a:rPr lang="en-US" dirty="0" err="1"/>
+              <a:t>ssable</a:t>
+            </a:r>
+            <a:r>
+              <a:rPr lang="en-US" dirty="0"/>
+              <a:t> by any electronic device capable of connecting to the internet,</a:t>
+            </a:r>
           </a:p>
           <a:p>
             <a:pPr marL="0" indent="0">
@@ -7335,155 +7568,7 @@
             </a:pPr>
             <a:r>
               <a:rPr lang="en-US" dirty="0"/>
-              <a:t>3. PDF through OMV to </a:t>
-            </a:r>
-            <a:r>
-              <a:rPr lang="en-US" dirty="0" err="1"/>
-              <a:t>MusicXML</a:t>
-            </a:r>
-            <a:r>
-              <a:rPr lang="en-US" dirty="0"/>
-              <a:t> [3]</a:t>
-            </a:r>
-          </a:p>
-          <a:p>
-            <a:pPr marL="0" indent="0">
-              <a:buNone/>
-            </a:pPr>
-            <a:endParaRPr lang="en-US" dirty="0"/>
-          </a:p>
-          <a:p>
-            <a:pPr marL="0" indent="0">
-              <a:buNone/>
-            </a:pPr>
-            <a:r>
-              <a:rPr lang="en-US" dirty="0"/>
-              <a:t>4. Transpose </a:t>
-            </a:r>
-            <a:r>
-              <a:rPr lang="en-US" dirty="0" err="1"/>
-              <a:t>MusicXML</a:t>
-            </a:r>
-            <a:r>
-              <a:rPr lang="en-US" dirty="0"/>
-              <a:t> using scripts [4]</a:t>
-            </a:r>
-          </a:p>
-          <a:p>
-            <a:pPr marL="0" indent="0">
-              <a:buNone/>
-            </a:pPr>
-            <a:endParaRPr lang="en-US" dirty="0"/>
-          </a:p>
-          <a:p>
-            <a:pPr marL="0" indent="0">
-              <a:buNone/>
-            </a:pPr>
-            <a:r>
-              <a:rPr lang="en-US" dirty="0"/>
-              <a:t>5. </a:t>
-            </a:r>
-            <a:r>
-              <a:rPr lang="en-US" dirty="0" err="1"/>
-              <a:t>MusicXML</a:t>
-            </a:r>
-            <a:r>
-              <a:rPr lang="en-US" dirty="0"/>
-              <a:t> to other formats [5]</a:t>
-            </a:r>
-          </a:p>
-          <a:p>
-            <a:pPr marL="0" indent="0">
-              <a:buNone/>
-            </a:pPr>
-            <a:endParaRPr lang="en-US" dirty="0"/>
-          </a:p>
-          <a:p>
-            <a:pPr marL="0" indent="0">
-              <a:buNone/>
-            </a:pPr>
-            <a:r>
-              <a:rPr lang="en-US" dirty="0"/>
-              <a:t>Data between the front-end and back-end will be sent using either AJAX</a:t>
-            </a:r>
-          </a:p>
-          <a:p>
-            <a:pPr marL="0" indent="0">
-              <a:buNone/>
-            </a:pPr>
-            <a:r>
-              <a:rPr lang="en-US" dirty="0"/>
-              <a:t>or </a:t>
-            </a:r>
-            <a:r>
-              <a:rPr lang="en-US" dirty="0" err="1"/>
-              <a:t>JQuery</a:t>
-            </a:r>
-            <a:r>
-              <a:rPr lang="en-US" dirty="0"/>
-              <a:t>, and received and processed with either NodeJS or Bash on an</a:t>
-            </a:r>
-          </a:p>
-          <a:p>
-            <a:pPr marL="0" indent="0">
-              <a:buNone/>
-            </a:pPr>
-            <a:r>
-              <a:rPr lang="en-US" dirty="0"/>
-              <a:t>Apache server. Proper CGI, user-friendliness, and responsive UI/UX is</a:t>
-            </a:r>
-          </a:p>
-          <a:p>
-            <a:pPr marL="0" indent="0">
-              <a:buNone/>
-            </a:pPr>
-            <a:r>
-              <a:rPr lang="en-US" dirty="0"/>
-              <a:t>attempted. </a:t>
-            </a:r>
-            <a:r>
-              <a:rPr lang="en-US" dirty="0" err="1"/>
-              <a:t>Strech</a:t>
-            </a:r>
-            <a:r>
-              <a:rPr lang="en-US" dirty="0"/>
-              <a:t> goals including displaying original and transposed</a:t>
-            </a:r>
-          </a:p>
-          <a:p>
-            <a:pPr marL="0" indent="0">
-              <a:buNone/>
-            </a:pPr>
-            <a:r>
-              <a:rPr lang="en-US" dirty="0"/>
-              <a:t>side by side, playing audio file, and transposing different parts of</a:t>
-            </a:r>
-          </a:p>
-          <a:p>
-            <a:pPr marL="0" indent="0">
-              <a:buNone/>
-            </a:pPr>
-            <a:r>
-              <a:rPr lang="en-US" dirty="0"/>
-              <a:t>the score to different keys. For copyright compliance, digital files</a:t>
-            </a:r>
-          </a:p>
-          <a:p>
-            <a:pPr marL="0" indent="0">
-              <a:buNone/>
-            </a:pPr>
-            <a:r>
-              <a:rPr lang="en-US" dirty="0"/>
-              <a:t>will not be able for public download, and all files will be marked at</a:t>
-            </a:r>
-          </a:p>
-          <a:p>
-            <a:pPr marL="0" indent="0">
-              <a:buNone/>
-            </a:pPr>
-            <a:r>
-              <a:rPr lang="en-US" dirty="0"/>
-              <a:t>the end of each session and removed periodically.</a:t>
+              <a:t>including phones and tablets.</a:t>
             </a:r>
           </a:p>
         </p:txBody>
@@ -7491,7 +7576,7 @@
     </p:spTree>
     <p:extLst>
       <p:ext uri="{BB962C8B-B14F-4D97-AF65-F5344CB8AC3E}">
-        <p14:creationId xmlns:p14="http://schemas.microsoft.com/office/powerpoint/2010/main" val="259731231"/>
+        <p14:creationId xmlns:p14="http://schemas.microsoft.com/office/powerpoint/2010/main" val="4262361891"/>
       </p:ext>
     </p:extLst>
   </p:cSld>

</xml_diff>